<commit_message>
handled user already exists
</commit_message>
<xml_diff>
--- a/doc/presentation/Care Connect.pptx
+++ b/doc/presentation/Care Connect.pptx
@@ -487,7 +487,7 @@
           <a:p>
             <a:fld id="{5DBB3301-3368-48DB-89E4-CBEE2183E2F1}" type="datetimeFigureOut">
               <a:rPr lang="en-US" smtClean="0"/>
-              <a:t>1/7/2024</a:t>
+              <a:t>1/8/2024</a:t>
             </a:fld>
             <a:endParaRPr lang="en-US"/>
           </a:p>
@@ -685,7 +685,7 @@
           <a:p>
             <a:fld id="{5DBB3301-3368-48DB-89E4-CBEE2183E2F1}" type="datetimeFigureOut">
               <a:rPr lang="en-US" smtClean="0"/>
-              <a:t>1/7/2024</a:t>
+              <a:t>1/8/2024</a:t>
             </a:fld>
             <a:endParaRPr lang="en-US"/>
           </a:p>
@@ -893,7 +893,7 @@
           <a:p>
             <a:fld id="{5DBB3301-3368-48DB-89E4-CBEE2183E2F1}" type="datetimeFigureOut">
               <a:rPr lang="en-US" smtClean="0"/>
-              <a:t>1/7/2024</a:t>
+              <a:t>1/8/2024</a:t>
             </a:fld>
             <a:endParaRPr lang="en-US"/>
           </a:p>
@@ -1091,7 +1091,7 @@
           <a:p>
             <a:fld id="{5DBB3301-3368-48DB-89E4-CBEE2183E2F1}" type="datetimeFigureOut">
               <a:rPr lang="en-US" smtClean="0"/>
-              <a:t>1/7/2024</a:t>
+              <a:t>1/8/2024</a:t>
             </a:fld>
             <a:endParaRPr lang="en-US"/>
           </a:p>
@@ -1366,7 +1366,7 @@
           <a:p>
             <a:fld id="{5DBB3301-3368-48DB-89E4-CBEE2183E2F1}" type="datetimeFigureOut">
               <a:rPr lang="en-US" smtClean="0"/>
-              <a:t>1/7/2024</a:t>
+              <a:t>1/8/2024</a:t>
             </a:fld>
             <a:endParaRPr lang="en-US"/>
           </a:p>
@@ -1631,7 +1631,7 @@
           <a:p>
             <a:fld id="{5DBB3301-3368-48DB-89E4-CBEE2183E2F1}" type="datetimeFigureOut">
               <a:rPr lang="en-US" smtClean="0"/>
-              <a:t>1/7/2024</a:t>
+              <a:t>1/8/2024</a:t>
             </a:fld>
             <a:endParaRPr lang="en-US"/>
           </a:p>
@@ -2043,7 +2043,7 @@
           <a:p>
             <a:fld id="{5DBB3301-3368-48DB-89E4-CBEE2183E2F1}" type="datetimeFigureOut">
               <a:rPr lang="en-US" smtClean="0"/>
-              <a:t>1/7/2024</a:t>
+              <a:t>1/8/2024</a:t>
             </a:fld>
             <a:endParaRPr lang="en-US"/>
           </a:p>
@@ -2184,7 +2184,7 @@
           <a:p>
             <a:fld id="{5DBB3301-3368-48DB-89E4-CBEE2183E2F1}" type="datetimeFigureOut">
               <a:rPr lang="en-US" smtClean="0"/>
-              <a:t>1/7/2024</a:t>
+              <a:t>1/8/2024</a:t>
             </a:fld>
             <a:endParaRPr lang="en-US"/>
           </a:p>
@@ -2297,7 +2297,7 @@
           <a:p>
             <a:fld id="{5DBB3301-3368-48DB-89E4-CBEE2183E2F1}" type="datetimeFigureOut">
               <a:rPr lang="en-US" smtClean="0"/>
-              <a:t>1/7/2024</a:t>
+              <a:t>1/8/2024</a:t>
             </a:fld>
             <a:endParaRPr lang="en-US"/>
           </a:p>
@@ -2608,7 +2608,7 @@
           <a:p>
             <a:fld id="{5DBB3301-3368-48DB-89E4-CBEE2183E2F1}" type="datetimeFigureOut">
               <a:rPr lang="en-US" smtClean="0"/>
-              <a:t>1/7/2024</a:t>
+              <a:t>1/8/2024</a:t>
             </a:fld>
             <a:endParaRPr lang="en-US"/>
           </a:p>
@@ -2896,7 +2896,7 @@
           <a:p>
             <a:fld id="{5DBB3301-3368-48DB-89E4-CBEE2183E2F1}" type="datetimeFigureOut">
               <a:rPr lang="en-US" smtClean="0"/>
-              <a:t>1/7/2024</a:t>
+              <a:t>1/8/2024</a:t>
             </a:fld>
             <a:endParaRPr lang="en-US"/>
           </a:p>
@@ -3137,7 +3137,7 @@
           <a:p>
             <a:fld id="{5DBB3301-3368-48DB-89E4-CBEE2183E2F1}" type="datetimeFigureOut">
               <a:rPr lang="en-US" smtClean="0"/>
-              <a:t>1/7/2024</a:t>
+              <a:t>1/8/2024</a:t>
             </a:fld>
             <a:endParaRPr lang="en-US"/>
           </a:p>
@@ -3609,7 +3609,7 @@
             </a:r>
             <a:r>
               <a:rPr lang="en-US" dirty="0"/>
-              <a:t>: </a:t>
+              <a:t>:  </a:t>
             </a:r>
             <a:r>
               <a:rPr lang="en-US" dirty="0" err="1"/>
@@ -4991,7 +4991,7 @@
             </a:pPr>
             <a:r>
               <a:rPr lang="en-US" sz="2400" dirty="0"/>
-              <a:t>     </a:t>
+              <a:t>      </a:t>
             </a:r>
             <a:r>
               <a:rPr lang="en-US" sz="2400" dirty="0" err="1"/>

</xml_diff>